<commit_message>
Tuning commandes et winch
</commit_message>
<xml_diff>
--- a/contrôles robot 2025.pptx
+++ b/contrôles robot 2025.pptx
@@ -115,6 +115,11 @@
       </a:defRPr>
     </a:lvl9pPr>
   </p:defaultTextStyle>
+  <p:extLst>
+    <p:ext uri="{EFAFB233-063F-42B5-8137-9DF3F51BA10A}">
+      <p15:sldGuideLst xmlns:p15="http://schemas.microsoft.com/office/powerpoint/2012/main"/>
+    </p:ext>
+  </p:extLst>
 </p:presentation>
 </file>
 
@@ -10615,7 +10620,7 @@
         <p:spPr>
           <a:xfrm>
             <a:off x="8564760" y="4151880"/>
-            <a:ext cx="1001520" cy="272520"/>
+            <a:ext cx="1571625" cy="275545"/>
           </a:xfrm>
           <a:prstGeom prst="rect">
             <a:avLst/>
@@ -10649,16 +10654,46 @@
               </a:lnSpc>
             </a:pPr>
             <a:r>
-              <a:rPr lang="en-US" sz="1200" b="0" u="none" strike="noStrike">
+              <a:rPr lang="en-US" sz="1200" b="0" u="none" strike="noStrike" dirty="0">
                 <a:solidFill>
                   <a:schemeClr val="dk1"/>
                 </a:solidFill>
                 <a:uFillTx/>
                 <a:latin typeface="Calibri"/>
               </a:rPr>
-              <a:t>Brake swerve</a:t>
-            </a:r>
-            <a:endParaRPr lang="fr-CA" sz="1200" b="0" u="none" strike="noStrike">
+              <a:t>Bras </a:t>
+            </a:r>
+            <a:r>
+              <a:rPr lang="en-US" sz="1200" b="0" u="none" strike="noStrike" dirty="0" err="1">
+                <a:solidFill>
+                  <a:schemeClr val="dk1"/>
+                </a:solidFill>
+                <a:uFillTx/>
+                <a:latin typeface="Calibri"/>
+              </a:rPr>
+              <a:t>en</a:t>
+            </a:r>
+            <a:r>
+              <a:rPr lang="en-US" sz="1200" b="0" u="none" strike="noStrike" dirty="0">
+                <a:solidFill>
+                  <a:schemeClr val="dk1"/>
+                </a:solidFill>
+                <a:uFillTx/>
+                <a:latin typeface="Calibri"/>
+              </a:rPr>
+              <a:t> position </a:t>
+            </a:r>
+            <a:r>
+              <a:rPr lang="en-US" sz="1200" b="0" u="none" strike="noStrike" dirty="0" err="1">
+                <a:solidFill>
+                  <a:schemeClr val="dk1"/>
+                </a:solidFill>
+                <a:uFillTx/>
+                <a:latin typeface="Calibri"/>
+              </a:rPr>
+              <a:t>basse</a:t>
+            </a:r>
+            <a:endParaRPr lang="fr-CA" sz="1200" b="0" u="none" strike="noStrike" dirty="0">
               <a:solidFill>
                 <a:srgbClr val="000000"/>
               </a:solidFill>
@@ -12498,8 +12533,8 @@
         </p:nvSpPr>
         <p:spPr>
           <a:xfrm>
-            <a:off x="4530600" y="873720"/>
-            <a:ext cx="517680" cy="272520"/>
+            <a:off x="4012627" y="1001520"/>
+            <a:ext cx="1571625" cy="275545"/>
           </a:xfrm>
           <a:prstGeom prst="rect">
             <a:avLst/>
@@ -12527,22 +12562,52 @@
           </a:bodyPr>
           <a:lstStyle/>
           <a:p>
-            <a:pPr algn="ctr" defTabSz="914400">
+            <a:pPr defTabSz="914400">
               <a:lnSpc>
                 <a:spcPct val="100000"/>
               </a:lnSpc>
             </a:pPr>
             <a:r>
-              <a:rPr lang="en-US" sz="1200" b="0" u="none" strike="noStrike">
+              <a:rPr lang="en-US" sz="1200" b="0" u="none" strike="noStrike" dirty="0">
                 <a:solidFill>
                   <a:schemeClr val="dk1"/>
                 </a:solidFill>
                 <a:uFillTx/>
                 <a:latin typeface="Calibri"/>
               </a:rPr>
-              <a:t>(rien)</a:t>
-            </a:r>
-            <a:endParaRPr lang="fr-CA" sz="1200" b="0" u="none" strike="noStrike">
+              <a:t>Bras </a:t>
+            </a:r>
+            <a:r>
+              <a:rPr lang="en-US" sz="1200" b="0" u="none" strike="noStrike" dirty="0" err="1">
+                <a:solidFill>
+                  <a:schemeClr val="dk1"/>
+                </a:solidFill>
+                <a:uFillTx/>
+                <a:latin typeface="Calibri"/>
+              </a:rPr>
+              <a:t>en</a:t>
+            </a:r>
+            <a:r>
+              <a:rPr lang="en-US" sz="1200" b="0" u="none" strike="noStrike" dirty="0">
+                <a:solidFill>
+                  <a:schemeClr val="dk1"/>
+                </a:solidFill>
+                <a:uFillTx/>
+                <a:latin typeface="Calibri"/>
+              </a:rPr>
+              <a:t> position </a:t>
+            </a:r>
+            <a:r>
+              <a:rPr lang="en-US" sz="1200" b="0" u="none" strike="noStrike" dirty="0" err="1">
+                <a:solidFill>
+                  <a:schemeClr val="dk1"/>
+                </a:solidFill>
+                <a:uFillTx/>
+                <a:latin typeface="Calibri"/>
+              </a:rPr>
+              <a:t>basse</a:t>
+            </a:r>
+            <a:endParaRPr lang="fr-CA" sz="1200" b="0" u="none" strike="noStrike" dirty="0">
               <a:solidFill>
                 <a:srgbClr val="000000"/>
               </a:solidFill>

</xml_diff>